<commit_message>
added tutorial video for nmrML converter webservice
</commit_message>
<xml_diff>
--- a/docs/cosmosWP2deliverables/WP2_AnnualReportSchober.pptx
+++ b/docs/cosmosWP2deliverables/WP2_AnnualReportSchober.pptx
@@ -247,7 +247,7 @@
           <a:p>
             <a:fld id="{E2AD6E30-188E-1A4B-8E76-7DAF7B7DD1F6}" type="datetimeFigureOut">
               <a:rPr lang="en-US" smtClean="0"/>
-              <a:t>10/1/2014</a:t>
+              <a:t>11/5/2014</a:t>
             </a:fld>
             <a:endParaRPr lang="en-US"/>
           </a:p>
@@ -2328,7 +2328,7 @@
             <a:fld id="{E30E2307-1E40-4E12-8716-25BFDA8E7013}" type="datetime1">
               <a:rPr lang="en-US" smtClean="0"/>
               <a:pPr/>
-              <a:t>10/1/2014</a:t>
+              <a:t>11/5/2014</a:t>
             </a:fld>
             <a:endParaRPr lang="en-US"/>
           </a:p>
@@ -2552,7 +2552,7 @@
             <a:fld id="{E5CFCF5A-EA79-452C-A52C-1A2668C2E7DF}" type="datetime1">
               <a:rPr lang="en-US" smtClean="0"/>
               <a:pPr/>
-              <a:t>10/1/2014</a:t>
+              <a:t>11/5/2014</a:t>
             </a:fld>
             <a:endParaRPr lang="en-US"/>
           </a:p>
@@ -2713,7 +2713,7 @@
             <a:fld id="{2E5C4C28-BD4B-4892-9A2D-6E19BD753A9A}" type="datetime1">
               <a:rPr lang="en-US" smtClean="0"/>
               <a:pPr/>
-              <a:t>10/1/2014</a:t>
+              <a:t>11/5/2014</a:t>
             </a:fld>
             <a:endParaRPr lang="en-US"/>
           </a:p>
@@ -4609,7 +4609,7 @@
             <a:fld id="{61FD9D02-426E-46C9-9EE9-0DE1EF8B2838}" type="datetime1">
               <a:rPr lang="en-US" smtClean="0"/>
               <a:pPr/>
-              <a:t>10/1/2014</a:t>
+              <a:t>11/5/2014</a:t>
             </a:fld>
             <a:endParaRPr lang="en-US"/>
           </a:p>
@@ -6489,7 +6489,7 @@
             <a:fld id="{7B8AEBBE-F8B2-42CF-9895-E86A608384EB}" type="datetime1">
               <a:rPr lang="en-US" smtClean="0"/>
               <a:pPr/>
-              <a:t>10/1/2014</a:t>
+              <a:t>11/5/2014</a:t>
             </a:fld>
             <a:endParaRPr lang="en-US"/>
           </a:p>
@@ -6699,7 +6699,7 @@
             <a:fld id="{E1FAA6B6-10E5-4810-BC9F-DA72D8452E73}" type="datetime1">
               <a:rPr lang="en-US" smtClean="0"/>
               <a:pPr/>
-              <a:t>10/1/2014</a:t>
+              <a:t>11/5/2014</a:t>
             </a:fld>
             <a:endParaRPr lang="en-US"/>
           </a:p>
@@ -7223,7 +7223,7 @@
             <a:fld id="{6D18D072-EF12-4AA2-BD71-ABC68B06D0E2}" type="datetime1">
               <a:rPr lang="en-US" smtClean="0"/>
               <a:pPr/>
-              <a:t>10/1/2014</a:t>
+              <a:t>11/5/2014</a:t>
             </a:fld>
             <a:endParaRPr lang="en-US"/>
           </a:p>
@@ -7346,7 +7346,7 @@
             <a:fld id="{B8CDBF60-6CC3-4B74-A60D-3486985E4346}" type="datetime1">
               <a:rPr lang="en-US" smtClean="0"/>
               <a:pPr/>
-              <a:t>10/1/2014</a:t>
+              <a:t>11/5/2014</a:t>
             </a:fld>
             <a:endParaRPr lang="en-US"/>
           </a:p>
@@ -9067,7 +9067,7 @@
             <a:fld id="{22714818-984F-4759-BF72-A33BDC1963BD}" type="datetime1">
               <a:rPr lang="en-US" smtClean="0"/>
               <a:pPr/>
-              <a:t>10/1/2014</a:t>
+              <a:t>11/5/2014</a:t>
             </a:fld>
             <a:endParaRPr lang="en-US"/>
           </a:p>
@@ -9288,7 +9288,7 @@
             <a:fld id="{9EA7E191-5F94-4FC1-B823-BD7CABF7FA06}" type="datetime1">
               <a:rPr lang="en-US" smtClean="0"/>
               <a:pPr/>
-              <a:t>10/1/2014</a:t>
+              <a:t>11/5/2014</a:t>
             </a:fld>
             <a:endParaRPr lang="en-US"/>
           </a:p>
@@ -12973,7 +12973,7 @@
             <a:fld id="{88856D55-EFBE-4F9B-8A5F-09D42CA22A9B}" type="datetime1">
               <a:rPr lang="en-US" smtClean="0"/>
               <a:pPr/>
-              <a:t>10/1/2014</a:t>
+              <a:t>11/5/2014</a:t>
             </a:fld>
             <a:endParaRPr lang="en-US"/>
           </a:p>
@@ -14902,7 +14902,7 @@
             <a:fld id="{9D1D110F-3F4E-48D9-B8AA-5D0E825AFDBA}" type="datetime1">
               <a:rPr lang="en-US" smtClean="0"/>
               <a:pPr/>
-              <a:t>10/1/2014</a:t>
+              <a:t>11/5/2014</a:t>
             </a:fld>
             <a:endParaRPr lang="en-US"/>
           </a:p>
@@ -17891,7 +17891,7 @@
           <a:p>
             <a:fld id="{64A60053-CA81-4DED-90B0-FE430279131F}" type="datetime1">
               <a:rPr lang="en-US" smtClean="0"/>
-              <a:t>10/1/2014</a:t>
+              <a:t>11/5/2014</a:t>
             </a:fld>
             <a:endParaRPr lang="en-US"/>
           </a:p>
@@ -20323,8 +20323,8 @@
         </p:blipFill>
         <p:spPr>
           <a:xfrm>
-            <a:off x="202261" y="133830"/>
-            <a:ext cx="8484539" cy="4772553"/>
+            <a:off x="133065" y="49171"/>
+            <a:ext cx="9134014" cy="4772553"/>
           </a:xfrm>
           <a:prstGeom prst="rect">
             <a:avLst/>
@@ -20355,8 +20355,8 @@
         </p:blipFill>
         <p:spPr>
           <a:xfrm>
-            <a:off x="9986" y="3279838"/>
-            <a:ext cx="8869088" cy="3578162"/>
+            <a:off x="133065" y="2949332"/>
+            <a:ext cx="9134014" cy="3578162"/>
           </a:xfrm>
         </p:spPr>
       </p:pic>
@@ -21643,7 +21643,7 @@
           <a:p>
             <a:fld id="{2962B889-C041-4D45-B960-B7DD90E5C5E9}" type="datetime1">
               <a:rPr lang="en-US" smtClean="0"/>
-              <a:t>10/1/2014</a:t>
+              <a:t>11/5/2014</a:t>
             </a:fld>
             <a:endParaRPr lang="en-US"/>
           </a:p>
@@ -23485,7 +23485,7 @@
           <a:p>
             <a:fld id="{050CC923-335D-4D34-A021-F107813AFFC8}" type="datetime1">
               <a:rPr lang="en-US" smtClean="0"/>
-              <a:t>10/1/2014</a:t>
+              <a:t>11/5/2014</a:t>
             </a:fld>
             <a:endParaRPr lang="en-US" dirty="0"/>
           </a:p>
@@ -23569,7 +23569,7 @@
           <a:p>
             <a:fld id="{5F7A9D5C-B110-4047-A71B-C6475C42EABA}" type="datetime1">
               <a:rPr lang="en-US" smtClean="0"/>
-              <a:t>10/1/2014</a:t>
+              <a:t>11/5/2014</a:t>
             </a:fld>
             <a:endParaRPr lang="en-US"/>
           </a:p>
@@ -25145,6 +25145,9 @@
           </a:bodyPr>
           <a:lstStyle/>
           <a:p>
+            <a:pPr marL="0" indent="0">
+              <a:buNone/>
+            </a:pPr>
             <a:r>
               <a:rPr lang="de-DE" dirty="0"/>
               <a:t> &lt;</a:t>
@@ -25159,6 +25162,9 @@
             </a:r>
           </a:p>
           <a:p>
+            <a:pPr marL="0" indent="0">
+              <a:buNone/>
+            </a:pPr>
             <a:r>
               <a:rPr lang="de-DE" dirty="0"/>
               <a:t>    &lt;</a:t>
@@ -25205,6 +25211,9 @@
             </a:r>
           </a:p>
           <a:p>
+            <a:pPr marL="0" indent="0">
+              <a:buNone/>
+            </a:pPr>
             <a:r>
               <a:rPr lang="de-DE" dirty="0"/>
               <a:t>     &lt;</a:t>
@@ -25219,6 +25228,9 @@
             </a:r>
           </a:p>
           <a:p>
+            <a:pPr marL="0" indent="0">
+              <a:buNone/>
+            </a:pPr>
             <a:r>
               <a:rPr lang="de-DE" dirty="0"/>
               <a:t>       &lt;</a:t>
@@ -25265,6 +25277,9 @@
             </a:r>
           </a:p>
           <a:p>
+            <a:pPr marL="0" indent="0">
+              <a:buNone/>
+            </a:pPr>
             <a:r>
               <a:rPr lang="de-DE" dirty="0"/>
               <a:t>       &lt;</a:t>
@@ -25295,6 +25310,9 @@
             </a:r>
           </a:p>
           <a:p>
+            <a:pPr marL="0" indent="0">
+              <a:buNone/>
+            </a:pPr>
             <a:r>
               <a:rPr lang="de-DE" dirty="0"/>
               <a:t>       </a:t>
@@ -25309,6 +25327,9 @@
             </a:r>
           </a:p>
           <a:p>
+            <a:pPr marL="0" indent="0">
+              <a:buNone/>
+            </a:pPr>
             <a:r>
               <a:rPr lang="de-DE" dirty="0"/>
               <a:t>       &lt;</a:t>
@@ -25339,6 +25360,9 @@
             </a:r>
           </a:p>
           <a:p>
+            <a:pPr marL="0" indent="0">
+              <a:buNone/>
+            </a:pPr>
             <a:r>
               <a:rPr lang="de-DE" dirty="0"/>
               <a:t>       &lt;</a:t>
@@ -25369,6 +25393,9 @@
             </a:r>
           </a:p>
           <a:p>
+            <a:pPr marL="0" indent="0">
+              <a:buNone/>
+            </a:pPr>
             <a:r>
               <a:rPr lang="de-DE" dirty="0"/>
               <a:t>       &lt;</a:t>
@@ -25404,6 +25431,9 @@
             <a:endParaRPr lang="de-DE" dirty="0"/>
           </a:p>
           <a:p>
+            <a:pPr marL="0" indent="0">
+              <a:buNone/>
+            </a:pPr>
             <a:r>
               <a:rPr lang="de-DE" dirty="0"/>
               <a:t>    </a:t>
@@ -25422,6 +25452,9 @@
             </a:r>
           </a:p>
           <a:p>
+            <a:pPr marL="0" indent="0">
+              <a:buNone/>
+            </a:pPr>
             <a:r>
               <a:rPr lang="de-DE" dirty="0"/>
               <a:t>     &lt;</a:t>
@@ -25436,6 +25469,9 @@
             </a:r>
           </a:p>
           <a:p>
+            <a:pPr marL="0" indent="0">
+              <a:buNone/>
+            </a:pPr>
             <a:r>
               <a:rPr lang="de-DE" dirty="0"/>
               <a:t>       &lt;</a:t>
@@ -25458,6 +25494,9 @@
             </a:r>
           </a:p>
           <a:p>
+            <a:pPr marL="0" indent="0">
+              <a:buNone/>
+            </a:pPr>
             <a:r>
               <a:rPr lang="de-DE" dirty="0"/>
               <a:t>       &lt;</a:t>
@@ -25480,6 +25519,9 @@
             </a:r>
           </a:p>
           <a:p>
+            <a:pPr marL="0" indent="0">
+              <a:buNone/>
+            </a:pPr>
             <a:r>
               <a:rPr lang="de-DE" dirty="0"/>
               <a:t>       &lt;</a:t>
@@ -25506,6 +25548,9 @@
             </a:r>
           </a:p>
           <a:p>
+            <a:pPr marL="0" indent="0">
+              <a:buNone/>
+            </a:pPr>
             <a:r>
               <a:rPr lang="de-DE" dirty="0"/>
               <a:t>     </a:t>
@@ -25525,6 +25570,9 @@
             <a:endParaRPr lang="de-DE" dirty="0"/>
           </a:p>
           <a:p>
+            <a:pPr marL="0" indent="0">
+              <a:buNone/>
+            </a:pPr>
             <a:r>
               <a:rPr lang="de-DE" dirty="0"/>
               <a:t>     &lt;/</a:t>
@@ -25539,6 +25587,9 @@
             </a:r>
           </a:p>
           <a:p>
+            <a:pPr marL="0" indent="0">
+              <a:buNone/>
+            </a:pPr>
             <a:r>
               <a:rPr lang="de-DE" dirty="0"/>
               <a:t>    &lt;/</a:t>
@@ -25596,6 +25647,9 @@
             </a:r>
           </a:p>
           <a:p>
+            <a:pPr marL="0" indent="0">
+              <a:buNone/>
+            </a:pPr>
             <a:r>
               <a:rPr lang="de-DE" dirty="0"/>
               <a:t>     &lt;</a:t>
@@ -25622,6 +25676,9 @@
             </a:r>
           </a:p>
           <a:p>
+            <a:pPr marL="0" indent="0">
+              <a:buNone/>
+            </a:pPr>
             <a:r>
               <a:rPr lang="de-DE" dirty="0"/>
               <a:t>     &lt;</a:t>
@@ -25676,6 +25733,9 @@
             </a:r>
           </a:p>
           <a:p>
+            <a:pPr marL="0" indent="0">
+              <a:buNone/>
+            </a:pPr>
             <a:r>
               <a:rPr lang="de-DE" dirty="0"/>
               <a:t>     &lt;</a:t>
@@ -25690,6 +25750,9 @@
             </a:r>
           </a:p>
           <a:p>
+            <a:pPr marL="0" indent="0">
+              <a:buNone/>
+            </a:pPr>
             <a:r>
               <a:rPr lang="de-DE" dirty="0"/>
               <a:t>       &lt;</a:t>

</xml_diff>